<commit_message>
wireframe abonnementen section toegevoegd & over ons page gemaakt
</commit_message>
<xml_diff>
--- a/documenten/corono-sprintreview-0.pptx
+++ b/documenten/corono-sprintreview-0.pptx
@@ -203,7 +203,7 @@
           <a:p>
             <a:fld id="{EE73DE52-BB83-CF4B-A5D7-04F131E9BA25}" type="datetimeFigureOut">
               <a:rPr lang="en-NL" smtClean="0"/>
-              <a:t>16/05/2021</a:t>
+              <a:t>17/05/2021</a:t>
             </a:fld>
             <a:endParaRPr lang="en-NL"/>
           </a:p>
@@ -650,7 +650,7 @@
           <a:effectLst/>
           <a:extLst>
             <a:ext uri="{91240B29-F687-4f45-9708-019B960494DF}">
-              <a14:hiddenLine xmlns:a14="http://schemas.microsoft.com/office/drawing/2010/main" xmlns="" w="9525">
+              <a14:hiddenLine xmlns="" xmlns:a14="http://schemas.microsoft.com/office/drawing/2010/main" w="9525">
                 <a:solidFill>
                   <a:srgbClr val="000000"/>
                 </a:solidFill>
@@ -843,7 +843,7 @@
             <a:fld id="{08B9EBBA-996F-894A-B54A-D6246ED52CEA}" type="datetimeFigureOut">
               <a:rPr lang="en-US" dirty="0"/>
               <a:pPr/>
-              <a:t>5/16/21</a:t>
+              <a:t>5/17/21</a:t>
             </a:fld>
             <a:endParaRPr lang="en-US" dirty="0"/>
           </a:p>
@@ -1158,7 +1158,7 @@
             <a:fld id="{18C79C5D-2A6F-F04D-97DA-BEF2467B64E4}" type="datetimeFigureOut">
               <a:rPr lang="en-US" dirty="0"/>
               <a:pPr/>
-              <a:t>5/16/21</a:t>
+              <a:t>5/17/21</a:t>
             </a:fld>
             <a:endParaRPr lang="en-US" dirty="0"/>
           </a:p>
@@ -1643,7 +1643,7 @@
             <a:fld id="{8DFA1846-DA80-1C48-A609-854EA85C59AD}" type="datetimeFigureOut">
               <a:rPr lang="en-US" dirty="0"/>
               <a:pPr/>
-              <a:t>5/16/21</a:t>
+              <a:t>5/17/21</a:t>
             </a:fld>
             <a:endParaRPr lang="en-US" dirty="0"/>
           </a:p>
@@ -2009,7 +2009,7 @@
             <a:fld id="{FBF54567-0DE4-3F47-BF90-CB84690072F9}" type="datetimeFigureOut">
               <a:rPr lang="en-US" dirty="0"/>
               <a:pPr/>
-              <a:t>5/16/21</a:t>
+              <a:t>5/17/21</a:t>
             </a:fld>
             <a:endParaRPr lang="en-US" dirty="0"/>
           </a:p>
@@ -2160,7 +2160,7 @@
           <a:ln/>
           <a:extLst>
             <a:ext uri="{91240B29-F687-4f45-9708-019B960494DF}">
-              <a14:hiddenLine xmlns:a14="http://schemas.microsoft.com/office/drawing/2010/main" xmlns="" w="9525">
+              <a14:hiddenLine xmlns="" xmlns:a14="http://schemas.microsoft.com/office/drawing/2010/main" w="9525">
                 <a:solidFill>
                   <a:srgbClr val="000000"/>
                 </a:solidFill>
@@ -2279,7 +2279,7 @@
             <a:fld id="{C6C52C72-DE31-F449-A4ED-4C594FD91407}" type="datetimeFigureOut">
               <a:rPr lang="en-US" dirty="0"/>
               <a:pPr/>
-              <a:t>5/16/21</a:t>
+              <a:t>5/17/21</a:t>
             </a:fld>
             <a:endParaRPr lang="en-US" dirty="0"/>
           </a:p>
@@ -2432,7 +2432,7 @@
           <a:ln/>
           <a:extLst>
             <a:ext uri="{91240B29-F687-4f45-9708-019B960494DF}">
-              <a14:hiddenLine xmlns:a14="http://schemas.microsoft.com/office/drawing/2010/main" xmlns="" w="9525">
+              <a14:hiddenLine xmlns="" xmlns:a14="http://schemas.microsoft.com/office/drawing/2010/main" w="9525">
                 <a:solidFill>
                   <a:srgbClr val="000000"/>
                 </a:solidFill>
@@ -2561,7 +2561,7 @@
             <a:fld id="{ED62726E-379B-B349-9EED-81ED093FA806}" type="datetimeFigureOut">
               <a:rPr lang="en-US" dirty="0"/>
               <a:pPr/>
-              <a:t>5/16/21</a:t>
+              <a:t>5/17/21</a:t>
             </a:fld>
             <a:endParaRPr lang="en-US" dirty="0"/>
           </a:p>
@@ -2712,7 +2712,7 @@
           <a:ln/>
           <a:extLst>
             <a:ext uri="{91240B29-F687-4f45-9708-019B960494DF}">
-              <a14:hiddenLine xmlns:a14="http://schemas.microsoft.com/office/drawing/2010/main" xmlns="" w="9525">
+              <a14:hiddenLine xmlns="" xmlns:a14="http://schemas.microsoft.com/office/drawing/2010/main" w="9525">
                 <a:solidFill>
                   <a:srgbClr val="000000"/>
                 </a:solidFill>
@@ -2841,7 +2841,7 @@
             <a:fld id="{9B3A1323-8D79-1946-B0D7-40001CF92E9D}" type="datetimeFigureOut">
               <a:rPr lang="en-US" dirty="0"/>
               <a:pPr/>
-              <a:t>5/16/21</a:t>
+              <a:t>5/17/21</a:t>
             </a:fld>
             <a:endParaRPr lang="en-US" dirty="0"/>
           </a:p>
@@ -3181,7 +3181,7 @@
             <a:fld id="{8DFA1846-DA80-1C48-A609-854EA85C59AD}" type="datetimeFigureOut">
               <a:rPr lang="en-US" dirty="0"/>
               <a:pPr/>
-              <a:t>5/16/21</a:t>
+              <a:t>5/17/21</a:t>
             </a:fld>
             <a:endParaRPr lang="en-US" dirty="0"/>
           </a:p>
@@ -3332,7 +3332,7 @@
           <a:ln/>
           <a:extLst>
             <a:ext uri="{91240B29-F687-4f45-9708-019B960494DF}">
-              <a14:hiddenLine xmlns:a14="http://schemas.microsoft.com/office/drawing/2010/main" xmlns="" w="9525">
+              <a14:hiddenLine xmlns="" xmlns:a14="http://schemas.microsoft.com/office/drawing/2010/main" w="9525">
                 <a:solidFill>
                   <a:srgbClr val="000000"/>
                 </a:solidFill>
@@ -3517,7 +3517,7 @@
             <a:fld id="{57302355-E14B-8545-A8F8-0FE83CC9D524}" type="datetimeFigureOut">
               <a:rPr lang="en-US" dirty="0"/>
               <a:pPr/>
-              <a:t>5/16/21</a:t>
+              <a:t>5/17/21</a:t>
             </a:fld>
             <a:endParaRPr lang="en-US" dirty="0"/>
           </a:p>
@@ -3668,7 +3668,7 @@
           <a:ln/>
           <a:extLst>
             <a:ext uri="{91240B29-F687-4f45-9708-019B960494DF}">
-              <a14:hiddenLine xmlns:a14="http://schemas.microsoft.com/office/drawing/2010/main" xmlns="" w="9525">
+              <a14:hiddenLine xmlns="" xmlns:a14="http://schemas.microsoft.com/office/drawing/2010/main" w="9525">
                 <a:solidFill>
                   <a:srgbClr val="000000"/>
                 </a:solidFill>
@@ -3991,7 +3991,7 @@
             <a:fld id="{02640F58-564D-2B4F-AE67-E407BA4FCF45}" type="datetimeFigureOut">
               <a:rPr lang="en-US" dirty="0"/>
               <a:pPr/>
-              <a:t>5/16/21</a:t>
+              <a:t>5/17/21</a:t>
             </a:fld>
             <a:endParaRPr lang="en-US" dirty="0"/>
           </a:p>
@@ -4142,7 +4142,7 @@
           <a:ln/>
           <a:extLst>
             <a:ext uri="{91240B29-F687-4f45-9708-019B960494DF}">
-              <a14:hiddenLine xmlns:a14="http://schemas.microsoft.com/office/drawing/2010/main" xmlns="" w="9525">
+              <a14:hiddenLine xmlns="" xmlns:a14="http://schemas.microsoft.com/office/drawing/2010/main" w="9525">
                 <a:solidFill>
                   <a:srgbClr val="000000"/>
                 </a:solidFill>
@@ -4209,7 +4209,7 @@
             <a:fld id="{F13A34C8-038E-2045-AF43-DF7DBB8E0E9E}" type="datetimeFigureOut">
               <a:rPr lang="en-US" dirty="0"/>
               <a:pPr/>
-              <a:t>5/16/21</a:t>
+              <a:t>5/17/21</a:t>
             </a:fld>
             <a:endParaRPr lang="en-US" dirty="0"/>
           </a:p>
@@ -4301,7 +4301,7 @@
             <a:fld id="{8818C68F-D26B-8F47-958C-23B49CF8A634}" type="datetimeFigureOut">
               <a:rPr lang="en-US" dirty="0"/>
               <a:pPr/>
-              <a:t>5/16/21</a:t>
+              <a:t>5/17/21</a:t>
             </a:fld>
             <a:endParaRPr lang="en-US" dirty="0"/>
           </a:p>
@@ -4565,7 +4565,7 @@
           <a:ln/>
           <a:extLst>
             <a:ext uri="{91240B29-F687-4f45-9708-019B960494DF}">
-              <a14:hiddenLine xmlns:a14="http://schemas.microsoft.com/office/drawing/2010/main" xmlns="" w="9525">
+              <a14:hiddenLine xmlns="" xmlns:a14="http://schemas.microsoft.com/office/drawing/2010/main" w="9525">
                 <a:solidFill>
                   <a:srgbClr val="000000"/>
                 </a:solidFill>
@@ -4765,7 +4765,7 @@
             <a:fld id="{D0DF5E60-9974-AC48-9591-99C2BB44B7CF}" type="datetimeFigureOut">
               <a:rPr lang="en-US" dirty="0"/>
               <a:pPr/>
-              <a:t>5/16/21</a:t>
+              <a:t>5/17/21</a:t>
             </a:fld>
             <a:endParaRPr lang="en-US" dirty="0"/>
           </a:p>
@@ -5075,7 +5075,7 @@
             <a:fld id="{18C79C5D-2A6F-F04D-97DA-BEF2467B64E4}" type="datetimeFigureOut">
               <a:rPr lang="en-US" dirty="0"/>
               <a:pPr/>
-              <a:t>5/16/21</a:t>
+              <a:t>5/17/21</a:t>
             </a:fld>
             <a:endParaRPr lang="en-US" dirty="0"/>
           </a:p>
@@ -5345,7 +5345,7 @@
             <a:fld id="{09B482E8-6E0E-1B4F-B1FD-C69DB9E858D9}" type="datetimeFigureOut">
               <a:rPr lang="en-US" dirty="0"/>
               <a:pPr/>
-              <a:t>5/16/21</a:t>
+              <a:t>5/17/21</a:t>
             </a:fld>
             <a:endParaRPr lang="en-US" dirty="0"/>
           </a:p>
@@ -6000,15 +6000,15 @@
           <a:p>
             <a:r>
               <a:rPr lang="en-GB" sz="2400" spc="-150" dirty="0">
-                <a:latin typeface="Aharoni" panose="02010803020104030203" pitchFamily="2" charset="-79"/>
-                <a:cs typeface="Aharoni" panose="02010803020104030203" pitchFamily="2" charset="-79"/>
+                <a:latin typeface="Futura Medium" panose="020B0602020204020303" pitchFamily="34" charset="-79"/>
+                <a:cs typeface="Futura Medium" panose="020B0602020204020303" pitchFamily="34" charset="-79"/>
               </a:rPr>
               <a:t>c</a:t>
             </a:r>
             <a:r>
               <a:rPr lang="en-NL" sz="2400" spc="-150" dirty="0">
-                <a:latin typeface="Aharoni" panose="02010803020104030203" pitchFamily="2" charset="-79"/>
-                <a:cs typeface="Aharoni" panose="02010803020104030203" pitchFamily="2" charset="-79"/>
+                <a:latin typeface="Futura Medium" panose="020B0602020204020303" pitchFamily="34" charset="-79"/>
+                <a:cs typeface="Futura Medium" panose="020B0602020204020303" pitchFamily="34" charset="-79"/>
               </a:rPr>
               <a:t>orono abonnement</a:t>
             </a:r>
@@ -6016,22 +6016,22 @@
           <a:p>
             <a:r>
               <a:rPr lang="en-GB" sz="2400" spc="-150" dirty="0" err="1">
-                <a:latin typeface="Aharoni" panose="02010803020104030203" pitchFamily="2" charset="-79"/>
-                <a:cs typeface="Aharoni" panose="02010803020104030203" pitchFamily="2" charset="-79"/>
+                <a:latin typeface="Futura Medium" panose="020B0602020204020303" pitchFamily="34" charset="-79"/>
+                <a:cs typeface="Futura Medium" panose="020B0602020204020303" pitchFamily="34" charset="-79"/>
               </a:rPr>
               <a:t>afspraakloos</a:t>
             </a:r>
             <a:r>
               <a:rPr lang="en-GB" sz="2400" spc="-150" dirty="0">
-                <a:latin typeface="Aharoni" panose="02010803020104030203" pitchFamily="2" charset="-79"/>
-                <a:cs typeface="Aharoni" panose="02010803020104030203" pitchFamily="2" charset="-79"/>
+                <a:latin typeface="Futura Medium" panose="020B0602020204020303" pitchFamily="34" charset="-79"/>
+                <a:cs typeface="Futura Medium" panose="020B0602020204020303" pitchFamily="34" charset="-79"/>
               </a:rPr>
               <a:t> w</a:t>
             </a:r>
             <a:r>
               <a:rPr lang="en-NL" sz="2400" spc="-150" dirty="0">
-                <a:latin typeface="Aharoni" panose="02010803020104030203" pitchFamily="2" charset="-79"/>
-                <a:cs typeface="Aharoni" panose="02010803020104030203" pitchFamily="2" charset="-79"/>
+                <a:latin typeface="Futura Medium" panose="020B0602020204020303" pitchFamily="34" charset="-79"/>
+                <a:cs typeface="Futura Medium" panose="020B0602020204020303" pitchFamily="34" charset="-79"/>
               </a:rPr>
               <a:t>inkels &amp; horeca in </a:t>
             </a:r>
@@ -6039,8 +6039,8 @@
           <a:p>
             <a:r>
               <a:rPr lang="en-NL" sz="2400" spc="-150" dirty="0">
-                <a:latin typeface="Aharoni" panose="02010803020104030203" pitchFamily="2" charset="-79"/>
-                <a:cs typeface="Aharoni" panose="02010803020104030203" pitchFamily="2" charset="-79"/>
+                <a:latin typeface="Futura Medium" panose="020B0602020204020303" pitchFamily="34" charset="-79"/>
+                <a:cs typeface="Futura Medium" panose="020B0602020204020303" pitchFamily="34" charset="-79"/>
               </a:rPr>
               <a:t>3 abonnementen</a:t>
             </a:r>
@@ -6650,7 +6650,7 @@
           <a:effectLst/>
           <a:extLst>
             <a:ext uri="{91240B29-F687-4f45-9708-019B960494DF}">
-              <a14:hiddenLine xmlns="" xmlns:a16="http://schemas.microsoft.com/office/drawing/2014/main" xmlns:p14="http://schemas.microsoft.com/office/powerpoint/2010/main" xmlns:a14="http://schemas.microsoft.com/office/drawing/2010/main" w="9525">
+              <a14:hiddenLine xmlns:a14="http://schemas.microsoft.com/office/drawing/2010/main" xmlns:p14="http://schemas.microsoft.com/office/powerpoint/2010/main" xmlns:a16="http://schemas.microsoft.com/office/drawing/2014/main" xmlns="" w="9525">
                 <a:solidFill>
                   <a:srgbClr val="000000"/>
                 </a:solidFill>
@@ -7532,12 +7532,16 @@
           <a:lstStyle/>
           <a:p>
             <a:r>
-              <a:rPr lang="en-NL" dirty="0">
+              <a:rPr lang="en-NL">
                 <a:latin typeface="Futura Medium" panose="020B0602020204020303" pitchFamily="34" charset="-79"/>
                 <a:cs typeface="Futura Medium" panose="020B0602020204020303" pitchFamily="34" charset="-79"/>
               </a:rPr>
               <a:t>Website</a:t>
             </a:r>
+            <a:endParaRPr lang="en-NL" dirty="0">
+              <a:latin typeface="Futura Medium" panose="020B0602020204020303" pitchFamily="34" charset="-79"/>
+              <a:cs typeface="Futura Medium" panose="020B0602020204020303" pitchFamily="34" charset="-79"/>
+            </a:endParaRPr>
           </a:p>
         </p:txBody>
       </p:sp>
@@ -7565,7 +7569,7 @@
           <a:lstStyle/>
           <a:p>
             <a:r>
-              <a:rPr lang="en-NL" sz="2400" spc="-150" dirty="0">
+              <a:rPr lang="en-NL" sz="2400" spc="-150">
                 <a:latin typeface="Futura Medium" panose="020B0602020204020303" pitchFamily="34" charset="-79"/>
                 <a:cs typeface="Futura Medium" panose="020B0602020204020303" pitchFamily="34" charset="-79"/>
                 <a:hlinkClick r:id="rId2">

</xml_diff>

<commit_message>
footer uitbreiding, vestigingen section & page en paar andere dingen
</commit_message>
<xml_diff>
--- a/documenten/corono-sprintreview-0.pptx
+++ b/documenten/corono-sprintreview-0.pptx
@@ -203,7 +203,7 @@
           <a:p>
             <a:fld id="{EE73DE52-BB83-CF4B-A5D7-04F131E9BA25}" type="datetimeFigureOut">
               <a:rPr lang="en-NL" smtClean="0"/>
-              <a:t>17/05/2021</a:t>
+              <a:t>31/05/2021</a:t>
             </a:fld>
             <a:endParaRPr lang="en-NL"/>
           </a:p>
@@ -650,7 +650,7 @@
           <a:effectLst/>
           <a:extLst>
             <a:ext uri="{91240B29-F687-4f45-9708-019B960494DF}">
-              <a14:hiddenLine xmlns="" xmlns:a14="http://schemas.microsoft.com/office/drawing/2010/main" w="9525">
+              <a14:hiddenLine xmlns:a14="http://schemas.microsoft.com/office/drawing/2010/main" xmlns="" w="9525">
                 <a:solidFill>
                   <a:srgbClr val="000000"/>
                 </a:solidFill>
@@ -843,7 +843,7 @@
             <a:fld id="{08B9EBBA-996F-894A-B54A-D6246ED52CEA}" type="datetimeFigureOut">
               <a:rPr lang="en-US" dirty="0"/>
               <a:pPr/>
-              <a:t>5/17/21</a:t>
+              <a:t>5/31/21</a:t>
             </a:fld>
             <a:endParaRPr lang="en-US" dirty="0"/>
           </a:p>
@@ -1158,7 +1158,7 @@
             <a:fld id="{18C79C5D-2A6F-F04D-97DA-BEF2467B64E4}" type="datetimeFigureOut">
               <a:rPr lang="en-US" dirty="0"/>
               <a:pPr/>
-              <a:t>5/17/21</a:t>
+              <a:t>5/31/21</a:t>
             </a:fld>
             <a:endParaRPr lang="en-US" dirty="0"/>
           </a:p>
@@ -1643,7 +1643,7 @@
             <a:fld id="{8DFA1846-DA80-1C48-A609-854EA85C59AD}" type="datetimeFigureOut">
               <a:rPr lang="en-US" dirty="0"/>
               <a:pPr/>
-              <a:t>5/17/21</a:t>
+              <a:t>5/31/21</a:t>
             </a:fld>
             <a:endParaRPr lang="en-US" dirty="0"/>
           </a:p>
@@ -2009,7 +2009,7 @@
             <a:fld id="{FBF54567-0DE4-3F47-BF90-CB84690072F9}" type="datetimeFigureOut">
               <a:rPr lang="en-US" dirty="0"/>
               <a:pPr/>
-              <a:t>5/17/21</a:t>
+              <a:t>5/31/21</a:t>
             </a:fld>
             <a:endParaRPr lang="en-US" dirty="0"/>
           </a:p>
@@ -2160,7 +2160,7 @@
           <a:ln/>
           <a:extLst>
             <a:ext uri="{91240B29-F687-4f45-9708-019B960494DF}">
-              <a14:hiddenLine xmlns="" xmlns:a14="http://schemas.microsoft.com/office/drawing/2010/main" w="9525">
+              <a14:hiddenLine xmlns:a14="http://schemas.microsoft.com/office/drawing/2010/main" xmlns="" w="9525">
                 <a:solidFill>
                   <a:srgbClr val="000000"/>
                 </a:solidFill>
@@ -2279,7 +2279,7 @@
             <a:fld id="{C6C52C72-DE31-F449-A4ED-4C594FD91407}" type="datetimeFigureOut">
               <a:rPr lang="en-US" dirty="0"/>
               <a:pPr/>
-              <a:t>5/17/21</a:t>
+              <a:t>5/31/21</a:t>
             </a:fld>
             <a:endParaRPr lang="en-US" dirty="0"/>
           </a:p>
@@ -2432,7 +2432,7 @@
           <a:ln/>
           <a:extLst>
             <a:ext uri="{91240B29-F687-4f45-9708-019B960494DF}">
-              <a14:hiddenLine xmlns="" xmlns:a14="http://schemas.microsoft.com/office/drawing/2010/main" w="9525">
+              <a14:hiddenLine xmlns:a14="http://schemas.microsoft.com/office/drawing/2010/main" xmlns="" w="9525">
                 <a:solidFill>
                   <a:srgbClr val="000000"/>
                 </a:solidFill>
@@ -2561,7 +2561,7 @@
             <a:fld id="{ED62726E-379B-B349-9EED-81ED093FA806}" type="datetimeFigureOut">
               <a:rPr lang="en-US" dirty="0"/>
               <a:pPr/>
-              <a:t>5/17/21</a:t>
+              <a:t>5/31/21</a:t>
             </a:fld>
             <a:endParaRPr lang="en-US" dirty="0"/>
           </a:p>
@@ -2712,7 +2712,7 @@
           <a:ln/>
           <a:extLst>
             <a:ext uri="{91240B29-F687-4f45-9708-019B960494DF}">
-              <a14:hiddenLine xmlns="" xmlns:a14="http://schemas.microsoft.com/office/drawing/2010/main" w="9525">
+              <a14:hiddenLine xmlns:a14="http://schemas.microsoft.com/office/drawing/2010/main" xmlns="" w="9525">
                 <a:solidFill>
                   <a:srgbClr val="000000"/>
                 </a:solidFill>
@@ -2841,7 +2841,7 @@
             <a:fld id="{9B3A1323-8D79-1946-B0D7-40001CF92E9D}" type="datetimeFigureOut">
               <a:rPr lang="en-US" dirty="0"/>
               <a:pPr/>
-              <a:t>5/17/21</a:t>
+              <a:t>5/31/21</a:t>
             </a:fld>
             <a:endParaRPr lang="en-US" dirty="0"/>
           </a:p>
@@ -3181,7 +3181,7 @@
             <a:fld id="{8DFA1846-DA80-1C48-A609-854EA85C59AD}" type="datetimeFigureOut">
               <a:rPr lang="en-US" dirty="0"/>
               <a:pPr/>
-              <a:t>5/17/21</a:t>
+              <a:t>5/31/21</a:t>
             </a:fld>
             <a:endParaRPr lang="en-US" dirty="0"/>
           </a:p>
@@ -3332,7 +3332,7 @@
           <a:ln/>
           <a:extLst>
             <a:ext uri="{91240B29-F687-4f45-9708-019B960494DF}">
-              <a14:hiddenLine xmlns="" xmlns:a14="http://schemas.microsoft.com/office/drawing/2010/main" w="9525">
+              <a14:hiddenLine xmlns:a14="http://schemas.microsoft.com/office/drawing/2010/main" xmlns="" w="9525">
                 <a:solidFill>
                   <a:srgbClr val="000000"/>
                 </a:solidFill>
@@ -3517,7 +3517,7 @@
             <a:fld id="{57302355-E14B-8545-A8F8-0FE83CC9D524}" type="datetimeFigureOut">
               <a:rPr lang="en-US" dirty="0"/>
               <a:pPr/>
-              <a:t>5/17/21</a:t>
+              <a:t>5/31/21</a:t>
             </a:fld>
             <a:endParaRPr lang="en-US" dirty="0"/>
           </a:p>
@@ -3668,7 +3668,7 @@
           <a:ln/>
           <a:extLst>
             <a:ext uri="{91240B29-F687-4f45-9708-019B960494DF}">
-              <a14:hiddenLine xmlns="" xmlns:a14="http://schemas.microsoft.com/office/drawing/2010/main" w="9525">
+              <a14:hiddenLine xmlns:a14="http://schemas.microsoft.com/office/drawing/2010/main" xmlns="" w="9525">
                 <a:solidFill>
                   <a:srgbClr val="000000"/>
                 </a:solidFill>
@@ -3991,7 +3991,7 @@
             <a:fld id="{02640F58-564D-2B4F-AE67-E407BA4FCF45}" type="datetimeFigureOut">
               <a:rPr lang="en-US" dirty="0"/>
               <a:pPr/>
-              <a:t>5/17/21</a:t>
+              <a:t>5/31/21</a:t>
             </a:fld>
             <a:endParaRPr lang="en-US" dirty="0"/>
           </a:p>
@@ -4142,7 +4142,7 @@
           <a:ln/>
           <a:extLst>
             <a:ext uri="{91240B29-F687-4f45-9708-019B960494DF}">
-              <a14:hiddenLine xmlns="" xmlns:a14="http://schemas.microsoft.com/office/drawing/2010/main" w="9525">
+              <a14:hiddenLine xmlns:a14="http://schemas.microsoft.com/office/drawing/2010/main" xmlns="" w="9525">
                 <a:solidFill>
                   <a:srgbClr val="000000"/>
                 </a:solidFill>
@@ -4209,7 +4209,7 @@
             <a:fld id="{F13A34C8-038E-2045-AF43-DF7DBB8E0E9E}" type="datetimeFigureOut">
               <a:rPr lang="en-US" dirty="0"/>
               <a:pPr/>
-              <a:t>5/17/21</a:t>
+              <a:t>5/31/21</a:t>
             </a:fld>
             <a:endParaRPr lang="en-US" dirty="0"/>
           </a:p>
@@ -4301,7 +4301,7 @@
             <a:fld id="{8818C68F-D26B-8F47-958C-23B49CF8A634}" type="datetimeFigureOut">
               <a:rPr lang="en-US" dirty="0"/>
               <a:pPr/>
-              <a:t>5/17/21</a:t>
+              <a:t>5/31/21</a:t>
             </a:fld>
             <a:endParaRPr lang="en-US" dirty="0"/>
           </a:p>
@@ -4565,7 +4565,7 @@
           <a:ln/>
           <a:extLst>
             <a:ext uri="{91240B29-F687-4f45-9708-019B960494DF}">
-              <a14:hiddenLine xmlns="" xmlns:a14="http://schemas.microsoft.com/office/drawing/2010/main" w="9525">
+              <a14:hiddenLine xmlns:a14="http://schemas.microsoft.com/office/drawing/2010/main" xmlns="" w="9525">
                 <a:solidFill>
                   <a:srgbClr val="000000"/>
                 </a:solidFill>
@@ -4765,7 +4765,7 @@
             <a:fld id="{D0DF5E60-9974-AC48-9591-99C2BB44B7CF}" type="datetimeFigureOut">
               <a:rPr lang="en-US" dirty="0"/>
               <a:pPr/>
-              <a:t>5/17/21</a:t>
+              <a:t>5/31/21</a:t>
             </a:fld>
             <a:endParaRPr lang="en-US" dirty="0"/>
           </a:p>
@@ -5075,7 +5075,7 @@
             <a:fld id="{18C79C5D-2A6F-F04D-97DA-BEF2467B64E4}" type="datetimeFigureOut">
               <a:rPr lang="en-US" dirty="0"/>
               <a:pPr/>
-              <a:t>5/17/21</a:t>
+              <a:t>5/31/21</a:t>
             </a:fld>
             <a:endParaRPr lang="en-US" dirty="0"/>
           </a:p>
@@ -5345,7 +5345,7 @@
             <a:fld id="{09B482E8-6E0E-1B4F-B1FD-C69DB9E858D9}" type="datetimeFigureOut">
               <a:rPr lang="en-US" dirty="0"/>
               <a:pPr/>
-              <a:t>5/17/21</a:t>
+              <a:t>5/31/21</a:t>
             </a:fld>
             <a:endParaRPr lang="en-US" dirty="0"/>
           </a:p>
@@ -5828,11 +5828,18 @@
               <a:t>s</a:t>
             </a:r>
             <a:r>
+              <a:rPr lang="en-NL" spc="-150">
+                <a:latin typeface="Futura Medium" panose="020B0602020204020303" pitchFamily="34" charset="-79"/>
+                <a:cs typeface="Futura Medium" panose="020B0602020204020303" pitchFamily="34" charset="-79"/>
+              </a:rPr>
+              <a:t>print 0 </a:t>
+            </a:r>
+            <a:r>
               <a:rPr lang="en-NL" spc="-150" dirty="0">
                 <a:latin typeface="Futura Medium" panose="020B0602020204020303" pitchFamily="34" charset="-79"/>
                 <a:cs typeface="Futura Medium" panose="020B0602020204020303" pitchFamily="34" charset="-79"/>
               </a:rPr>
-              <a:t>print 0 review </a:t>
+              <a:t>review </a:t>
             </a:r>
           </a:p>
         </p:txBody>
@@ -6650,7 +6657,7 @@
           <a:effectLst/>
           <a:extLst>
             <a:ext uri="{91240B29-F687-4f45-9708-019B960494DF}">
-              <a14:hiddenLine xmlns:a14="http://schemas.microsoft.com/office/drawing/2010/main" xmlns:p14="http://schemas.microsoft.com/office/powerpoint/2010/main" xmlns:a16="http://schemas.microsoft.com/office/drawing/2014/main" xmlns="" w="9525">
+              <a14:hiddenLine xmlns="" xmlns:a16="http://schemas.microsoft.com/office/drawing/2014/main" xmlns:p14="http://schemas.microsoft.com/office/powerpoint/2010/main" xmlns:a14="http://schemas.microsoft.com/office/drawing/2010/main" w="9525">
                 <a:solidFill>
                   <a:srgbClr val="000000"/>
                 </a:solidFill>

</xml_diff>